<commit_message>
Neural parquet added; ReadMe changed; parquet helper function added
</commit_message>
<xml_diff>
--- a/docs/reports/presentation/slides.pptx
+++ b/docs/reports/presentation/slides.pptx
@@ -16191,7 +16191,7 @@
         </p:nvGrpSpPr>
         <p:grpSpPr>
           <a:xfrm>
-            <a:off x="1371600" y="2781300"/>
+            <a:off x="762000" y="2781300"/>
             <a:ext cx="3447216" cy="7370316"/>
             <a:chOff x="0" y="0"/>
             <a:chExt cx="1198766" cy="1433761"/>
@@ -16288,7 +16288,7 @@
         </p:nvGrpSpPr>
         <p:grpSpPr>
           <a:xfrm>
-            <a:off x="5447747" y="2781300"/>
+            <a:off x="4838147" y="2781300"/>
             <a:ext cx="3447216" cy="7370316"/>
             <a:chOff x="0" y="0"/>
             <a:chExt cx="1198766" cy="1433761"/>
@@ -16385,8 +16385,8 @@
         </p:nvGrpSpPr>
         <p:grpSpPr>
           <a:xfrm>
-            <a:off x="9562547" y="2781300"/>
-            <a:ext cx="3447216" cy="7370316"/>
+            <a:off x="8915400" y="2781300"/>
+            <a:ext cx="4876800" cy="7370316"/>
             <a:chOff x="0" y="0"/>
             <a:chExt cx="1198766" cy="1433761"/>
           </a:xfrm>
@@ -16482,7 +16482,7 @@
         </p:nvGrpSpPr>
         <p:grpSpPr>
           <a:xfrm>
-            <a:off x="1219200" y="2628900"/>
+            <a:off x="609600" y="2628900"/>
             <a:ext cx="3447216" cy="7370316"/>
             <a:chOff x="0" y="0"/>
             <a:chExt cx="1198766" cy="1433761"/>
@@ -16579,7 +16579,7 @@
         </p:nvGrpSpPr>
         <p:grpSpPr>
           <a:xfrm>
-            <a:off x="5295347" y="2628900"/>
+            <a:off x="4685747" y="2628900"/>
             <a:ext cx="3447216" cy="7370316"/>
             <a:chOff x="0" y="0"/>
             <a:chExt cx="1198766" cy="1433761"/>
@@ -16676,8 +16676,8 @@
         </p:nvGrpSpPr>
         <p:grpSpPr>
           <a:xfrm>
-            <a:off x="9410147" y="2628900"/>
-            <a:ext cx="3447216" cy="7370316"/>
+            <a:off x="8763000" y="2628900"/>
+            <a:ext cx="4876800" cy="7370316"/>
             <a:chOff x="0" y="0"/>
             <a:chExt cx="1198766" cy="1433761"/>
           </a:xfrm>
@@ -16773,7 +16773,7 @@
         </p:nvSpPr>
         <p:spPr>
           <a:xfrm>
-            <a:off x="1404438" y="3807299"/>
+            <a:off x="794838" y="3807299"/>
             <a:ext cx="3166627" cy="3015505"/>
           </a:xfrm>
           <a:prstGeom prst="rect">
@@ -16915,7 +16915,7 @@
         </p:nvSpPr>
         <p:spPr>
           <a:xfrm>
-            <a:off x="2057400" y="2985440"/>
+            <a:off x="1447800" y="2985440"/>
             <a:ext cx="1905000" cy="564129"/>
           </a:xfrm>
           <a:prstGeom prst="rect">
@@ -16959,7 +16959,7 @@
         </p:nvSpPr>
         <p:spPr>
           <a:xfrm>
-            <a:off x="5867400" y="2985440"/>
+            <a:off x="5257800" y="2985440"/>
             <a:ext cx="2322635" cy="571803"/>
           </a:xfrm>
           <a:prstGeom prst="rect">
@@ -17003,7 +17003,7 @@
         </p:nvSpPr>
         <p:spPr>
           <a:xfrm>
-            <a:off x="5545742" y="3807299"/>
+            <a:off x="4936142" y="3807299"/>
             <a:ext cx="3065620" cy="4759573"/>
           </a:xfrm>
           <a:prstGeom prst="rect">
@@ -17169,8 +17169,8 @@
         </p:nvSpPr>
         <p:spPr>
           <a:xfrm>
-            <a:off x="10153284" y="2985440"/>
-            <a:ext cx="1752132" cy="571803"/>
+            <a:off x="9506136" y="2985440"/>
+            <a:ext cx="2478753" cy="571803"/>
           </a:xfrm>
           <a:prstGeom prst="rect">
             <a:avLst/>
@@ -17446,7 +17446,7 @@
         </p:nvGrpSpPr>
         <p:grpSpPr>
           <a:xfrm>
-            <a:off x="13659131" y="2802384"/>
+            <a:off x="14231184" y="2802384"/>
             <a:ext cx="3447216" cy="7370316"/>
             <a:chOff x="0" y="0"/>
             <a:chExt cx="1198766" cy="1433761"/>
@@ -17561,7 +17561,7 @@
         </p:nvGrpSpPr>
         <p:grpSpPr>
           <a:xfrm>
-            <a:off x="13506731" y="2649984"/>
+            <a:off x="14078784" y="2649984"/>
             <a:ext cx="3447216" cy="7370316"/>
             <a:chOff x="0" y="0"/>
             <a:chExt cx="1198766" cy="1433761"/>
@@ -17676,7 +17676,7 @@
         </p:nvSpPr>
         <p:spPr>
           <a:xfrm>
-            <a:off x="14249868" y="3006524"/>
+            <a:off x="14821921" y="3006524"/>
             <a:ext cx="1752132" cy="571803"/>
           </a:xfrm>
           <a:prstGeom prst="rect">
@@ -17726,8 +17726,8 @@
         </p:nvSpPr>
         <p:spPr>
           <a:xfrm>
-            <a:off x="9581321" y="3807299"/>
-            <a:ext cx="3065620" cy="6067623"/>
+            <a:off x="8934174" y="3807299"/>
+            <a:ext cx="4400826" cy="5631606"/>
           </a:xfrm>
           <a:prstGeom prst="rect">
             <a:avLst/>
@@ -18018,6 +18018,42 @@
             </a:endParaRPr>
           </a:p>
           <a:p>
+            <a:pPr marL="342900" indent="-342900">
+              <a:lnSpc>
+                <a:spcPts val="3359"/>
+              </a:lnSpc>
+              <a:spcBef>
+                <a:spcPct val="0"/>
+              </a:spcBef>
+              <a:buFontTx/>
+              <a:buChar char="-"/>
+            </a:pPr>
+            <a:r>
+              <a:rPr lang="en-US" sz="2400" dirty="0" err="1">
+                <a:solidFill>
+                  <a:srgbClr val="000000"/>
+                </a:solidFill>
+                <a:latin typeface="Inter"/>
+                <a:ea typeface="Inter"/>
+                <a:cs typeface="Inter"/>
+                <a:sym typeface="Inter"/>
+              </a:rPr>
+              <a:t>XGBoost</a:t>
+            </a:r>
+            <a:r>
+              <a:rPr lang="en-US" sz="2400" dirty="0">
+                <a:solidFill>
+                  <a:srgbClr val="000000"/>
+                </a:solidFill>
+                <a:latin typeface="Inter"/>
+                <a:ea typeface="Inter"/>
+                <a:cs typeface="Inter"/>
+                <a:sym typeface="Inter"/>
+              </a:rPr>
+              <a:t> [+ Random Forest]</a:t>
+            </a:r>
+          </a:p>
+          <a:p>
             <a:pPr marL="342900" indent="-342900" algn="just">
               <a:lnSpc>
                 <a:spcPts val="3359"/>
@@ -18029,18 +18065,6 @@
               <a:buChar char="-"/>
             </a:pPr>
             <a:r>
-              <a:rPr lang="en-US" sz="2400" dirty="0" err="1">
-                <a:solidFill>
-                  <a:srgbClr val="000000"/>
-                </a:solidFill>
-                <a:latin typeface="Inter"/>
-                <a:ea typeface="Inter"/>
-                <a:cs typeface="Inter"/>
-                <a:sym typeface="Inter"/>
-              </a:rPr>
-              <a:t>XGBoost</a:t>
-            </a:r>
-            <a:r>
               <a:rPr lang="en-US" sz="2400" dirty="0">
                 <a:solidFill>
                   <a:srgbClr val="000000"/>
@@ -18050,7 +18074,7 @@
                 <a:cs typeface="Inter"/>
                 <a:sym typeface="Inter"/>
               </a:rPr>
-              <a:t> [+ Random Forest]</a:t>
+              <a:t>Support Vector Regression</a:t>
             </a:r>
           </a:p>
           <a:p>
@@ -18074,7 +18098,7 @@
                 <a:cs typeface="Inter"/>
                 <a:sym typeface="Inter"/>
               </a:rPr>
-              <a:t>Support Vector Regression</a:t>
+              <a:t>MLP Regressor</a:t>
             </a:r>
           </a:p>
         </p:txBody>
@@ -18093,8 +18117,8 @@
         </p:nvSpPr>
         <p:spPr>
           <a:xfrm>
-            <a:off x="13697529" y="3807299"/>
-            <a:ext cx="3065620" cy="1707455"/>
+            <a:off x="14269582" y="3807299"/>
+            <a:ext cx="3065620" cy="2143472"/>
           </a:xfrm>
           <a:prstGeom prst="rect">
             <a:avLst/>
@@ -18198,7 +18222,31 @@
                 <a:cs typeface="Inter"/>
                 <a:sym typeface="Inter"/>
               </a:rPr>
-              <a:t>MLP Regressor</a:t>
+              <a:t>GRU</a:t>
+            </a:r>
+          </a:p>
+          <a:p>
+            <a:pPr marL="342900" indent="-342900" algn="just">
+              <a:lnSpc>
+                <a:spcPts val="3359"/>
+              </a:lnSpc>
+              <a:spcBef>
+                <a:spcPct val="0"/>
+              </a:spcBef>
+              <a:buFontTx/>
+              <a:buChar char="-"/>
+            </a:pPr>
+            <a:r>
+              <a:rPr lang="en-US" sz="2400" dirty="0">
+                <a:solidFill>
+                  <a:srgbClr val="000000"/>
+                </a:solidFill>
+                <a:latin typeface="Inter"/>
+                <a:ea typeface="Inter"/>
+                <a:cs typeface="Inter"/>
+                <a:sym typeface="Inter"/>
+              </a:rPr>
+              <a:t>RNN</a:t>
             </a:r>
           </a:p>
         </p:txBody>

</xml_diff>